<commit_message>
update architecture diagram + README
</commit_message>
<xml_diff>
--- a/assets/architecture.pptx
+++ b/assets/architecture.pptx
@@ -261,7 +261,7 @@
           <a:p>
             <a:fld id="{50A4B99F-F661-4EBB-892F-320C0905BC79}" type="datetimeFigureOut">
               <a:rPr lang="fr-FR" smtClean="0"/>
-              <a:t>01/07/2019</a:t>
+              <a:t>09/07/2019</a:t>
             </a:fld>
             <a:endParaRPr lang="fr-FR"/>
           </a:p>
@@ -461,7 +461,7 @@
           <a:p>
             <a:fld id="{50A4B99F-F661-4EBB-892F-320C0905BC79}" type="datetimeFigureOut">
               <a:rPr lang="fr-FR" smtClean="0"/>
-              <a:t>01/07/2019</a:t>
+              <a:t>09/07/2019</a:t>
             </a:fld>
             <a:endParaRPr lang="fr-FR"/>
           </a:p>
@@ -671,7 +671,7 @@
           <a:p>
             <a:fld id="{50A4B99F-F661-4EBB-892F-320C0905BC79}" type="datetimeFigureOut">
               <a:rPr lang="fr-FR" smtClean="0"/>
-              <a:t>01/07/2019</a:t>
+              <a:t>09/07/2019</a:t>
             </a:fld>
             <a:endParaRPr lang="fr-FR"/>
           </a:p>
@@ -871,7 +871,7 @@
           <a:p>
             <a:fld id="{50A4B99F-F661-4EBB-892F-320C0905BC79}" type="datetimeFigureOut">
               <a:rPr lang="fr-FR" smtClean="0"/>
-              <a:t>01/07/2019</a:t>
+              <a:t>09/07/2019</a:t>
             </a:fld>
             <a:endParaRPr lang="fr-FR"/>
           </a:p>
@@ -1147,7 +1147,7 @@
           <a:p>
             <a:fld id="{50A4B99F-F661-4EBB-892F-320C0905BC79}" type="datetimeFigureOut">
               <a:rPr lang="fr-FR" smtClean="0"/>
-              <a:t>01/07/2019</a:t>
+              <a:t>09/07/2019</a:t>
             </a:fld>
             <a:endParaRPr lang="fr-FR"/>
           </a:p>
@@ -1415,7 +1415,7 @@
           <a:p>
             <a:fld id="{50A4B99F-F661-4EBB-892F-320C0905BC79}" type="datetimeFigureOut">
               <a:rPr lang="fr-FR" smtClean="0"/>
-              <a:t>01/07/2019</a:t>
+              <a:t>09/07/2019</a:t>
             </a:fld>
             <a:endParaRPr lang="fr-FR"/>
           </a:p>
@@ -1830,7 +1830,7 @@
           <a:p>
             <a:fld id="{50A4B99F-F661-4EBB-892F-320C0905BC79}" type="datetimeFigureOut">
               <a:rPr lang="fr-FR" smtClean="0"/>
-              <a:t>01/07/2019</a:t>
+              <a:t>09/07/2019</a:t>
             </a:fld>
             <a:endParaRPr lang="fr-FR"/>
           </a:p>
@@ -1972,7 +1972,7 @@
           <a:p>
             <a:fld id="{50A4B99F-F661-4EBB-892F-320C0905BC79}" type="datetimeFigureOut">
               <a:rPr lang="fr-FR" smtClean="0"/>
-              <a:t>01/07/2019</a:t>
+              <a:t>09/07/2019</a:t>
             </a:fld>
             <a:endParaRPr lang="fr-FR"/>
           </a:p>
@@ -2085,7 +2085,7 @@
           <a:p>
             <a:fld id="{50A4B99F-F661-4EBB-892F-320C0905BC79}" type="datetimeFigureOut">
               <a:rPr lang="fr-FR" smtClean="0"/>
-              <a:t>01/07/2019</a:t>
+              <a:t>09/07/2019</a:t>
             </a:fld>
             <a:endParaRPr lang="fr-FR"/>
           </a:p>
@@ -2398,7 +2398,7 @@
           <a:p>
             <a:fld id="{50A4B99F-F661-4EBB-892F-320C0905BC79}" type="datetimeFigureOut">
               <a:rPr lang="fr-FR" smtClean="0"/>
-              <a:t>01/07/2019</a:t>
+              <a:t>09/07/2019</a:t>
             </a:fld>
             <a:endParaRPr lang="fr-FR"/>
           </a:p>
@@ -2687,7 +2687,7 @@
           <a:p>
             <a:fld id="{50A4B99F-F661-4EBB-892F-320C0905BC79}" type="datetimeFigureOut">
               <a:rPr lang="fr-FR" smtClean="0"/>
-              <a:t>01/07/2019</a:t>
+              <a:t>09/07/2019</a:t>
             </a:fld>
             <a:endParaRPr lang="fr-FR"/>
           </a:p>
@@ -2930,7 +2930,7 @@
           <a:p>
             <a:fld id="{50A4B99F-F661-4EBB-892F-320C0905BC79}" type="datetimeFigureOut">
               <a:rPr lang="fr-FR" smtClean="0"/>
-              <a:t>01/07/2019</a:t>
+              <a:t>09/07/2019</a:t>
             </a:fld>
             <a:endParaRPr lang="fr-FR"/>
           </a:p>
@@ -4480,45 +4480,6 @@
             </a:prstGeom>
           </p:spPr>
         </p:pic>
-        <p:pic>
-          <p:nvPicPr>
-            <p:cNvPr id="75" name="Graphic 74">
-              <a:extLst>
-                <a:ext uri="{FF2B5EF4-FFF2-40B4-BE49-F238E27FC236}">
-                  <a16:creationId xmlns:a16="http://schemas.microsoft.com/office/drawing/2014/main" id="{76589FCD-962A-4218-816C-847B04BA8144}"/>
-                </a:ext>
-              </a:extLst>
-            </p:cNvPr>
-            <p:cNvPicPr>
-              <a:picLocks noChangeAspect="1"/>
-            </p:cNvPicPr>
-            <p:nvPr/>
-          </p:nvPicPr>
-          <p:blipFill>
-            <a:blip r:embed="rId4">
-              <a:extLst>
-                <a:ext uri="{28A0092B-C50C-407E-A947-70E740481C1C}">
-                  <a14:useLocalDpi xmlns:a14="http://schemas.microsoft.com/office/drawing/2010/main" val="0"/>
-                </a:ext>
-                <a:ext uri="{96DAC541-7B7A-43D3-8B79-37D633B846F1}">
-                  <asvg:svgBlip xmlns:asvg="http://schemas.microsoft.com/office/drawing/2016/SVG/main" r:embed="rId5"/>
-                </a:ext>
-              </a:extLst>
-            </a:blip>
-            <a:stretch>
-              <a:fillRect/>
-            </a:stretch>
-          </p:blipFill>
-          <p:spPr>
-            <a:xfrm>
-              <a:off x="1037612" y="2512971"/>
-              <a:ext cx="231078" cy="231078"/>
-            </a:xfrm>
-            <a:prstGeom prst="rect">
-              <a:avLst/>
-            </a:prstGeom>
-          </p:spPr>
-        </p:pic>
         <p:sp>
           <p:nvSpPr>
             <p:cNvPr id="77" name="TextBox 76">
@@ -5808,45 +5769,6 @@
             </a:prstGeom>
           </p:spPr>
         </p:pic>
-        <p:pic>
-          <p:nvPicPr>
-            <p:cNvPr id="116" name="Graphic 115">
-              <a:extLst>
-                <a:ext uri="{FF2B5EF4-FFF2-40B4-BE49-F238E27FC236}">
-                  <a16:creationId xmlns:a16="http://schemas.microsoft.com/office/drawing/2014/main" id="{A107D3BF-4B17-4C8C-97A8-A5324B3FF192}"/>
-                </a:ext>
-              </a:extLst>
-            </p:cNvPr>
-            <p:cNvPicPr>
-              <a:picLocks noChangeAspect="1"/>
-            </p:cNvPicPr>
-            <p:nvPr/>
-          </p:nvPicPr>
-          <p:blipFill>
-            <a:blip r:embed="rId4">
-              <a:extLst>
-                <a:ext uri="{28A0092B-C50C-407E-A947-70E740481C1C}">
-                  <a14:useLocalDpi xmlns:a14="http://schemas.microsoft.com/office/drawing/2010/main" val="0"/>
-                </a:ext>
-                <a:ext uri="{96DAC541-7B7A-43D3-8B79-37D633B846F1}">
-                  <asvg:svgBlip xmlns:asvg="http://schemas.microsoft.com/office/drawing/2016/SVG/main" r:embed="rId5"/>
-                </a:ext>
-              </a:extLst>
-            </a:blip>
-            <a:stretch>
-              <a:fillRect/>
-            </a:stretch>
-          </p:blipFill>
-          <p:spPr>
-            <a:xfrm>
-              <a:off x="1037612" y="2512971"/>
-              <a:ext cx="231078" cy="231078"/>
-            </a:xfrm>
-            <a:prstGeom prst="rect">
-              <a:avLst/>
-            </a:prstGeom>
-          </p:spPr>
-        </p:pic>
         <p:sp>
           <p:nvSpPr>
             <p:cNvPr id="117" name="TextBox 116">
@@ -6920,45 +6842,6 @@
             <a:xfrm>
               <a:off x="768403" y="2573443"/>
               <a:ext cx="757908" cy="585656"/>
-            </a:xfrm>
-            <a:prstGeom prst="rect">
-              <a:avLst/>
-            </a:prstGeom>
-          </p:spPr>
-        </p:pic>
-        <p:pic>
-          <p:nvPicPr>
-            <p:cNvPr id="143" name="Graphic 142">
-              <a:extLst>
-                <a:ext uri="{FF2B5EF4-FFF2-40B4-BE49-F238E27FC236}">
-                  <a16:creationId xmlns:a16="http://schemas.microsoft.com/office/drawing/2014/main" id="{1F572D62-F8F0-4E3C-BF18-0F7B17AB410F}"/>
-                </a:ext>
-              </a:extLst>
-            </p:cNvPr>
-            <p:cNvPicPr>
-              <a:picLocks noChangeAspect="1"/>
-            </p:cNvPicPr>
-            <p:nvPr/>
-          </p:nvPicPr>
-          <p:blipFill>
-            <a:blip r:embed="rId4">
-              <a:extLst>
-                <a:ext uri="{28A0092B-C50C-407E-A947-70E740481C1C}">
-                  <a14:useLocalDpi xmlns:a14="http://schemas.microsoft.com/office/drawing/2010/main" val="0"/>
-                </a:ext>
-                <a:ext uri="{96DAC541-7B7A-43D3-8B79-37D633B846F1}">
-                  <asvg:svgBlip xmlns:asvg="http://schemas.microsoft.com/office/drawing/2016/SVG/main" r:embed="rId5"/>
-                </a:ext>
-              </a:extLst>
-            </a:blip>
-            <a:stretch>
-              <a:fillRect/>
-            </a:stretch>
-          </p:blipFill>
-          <p:spPr>
-            <a:xfrm>
-              <a:off x="1037612" y="2512971"/>
-              <a:ext cx="231078" cy="231078"/>
             </a:xfrm>
             <a:prstGeom prst="rect">
               <a:avLst/>

</xml_diff>